<commit_message>
update: slides-118-anima-update-jws-voucher.pptx and PDF export
</commit_message>
<xml_diff>
--- a/presentations/slides-118-anima-update-jws-voucher.pptx
+++ b/presentations/slides-118-anima-update-jws-voucher.pptx
@@ -225,7 +225,7 @@
           <a:p>
             <a:fld id="{33B5B5E8-CA78-4A82-83A0-867EF5A818AE}" type="datetimeFigureOut">
               <a:rPr lang="en-US" smtClean="0"/>
-              <a:t>10/27/23</a:t>
+              <a:t>11/3/23</a:t>
             </a:fld>
             <a:endParaRPr lang="en-US"/>
           </a:p>
@@ -815,7 +815,7 @@
           <a:p>
             <a:fld id="{8C792E63-5F21-4F54-A864-D84D9F273FCA}" type="datetimeFigureOut">
               <a:rPr lang="en-US" smtClean="0"/>
-              <a:t>10/27/23</a:t>
+              <a:t>11/3/23</a:t>
             </a:fld>
             <a:endParaRPr lang="en-US" dirty="0"/>
           </a:p>
@@ -1033,7 +1033,7 @@
           <a:p>
             <a:fld id="{8C792E63-5F21-4F54-A864-D84D9F273FCA}" type="datetimeFigureOut">
               <a:rPr lang="en-US" smtClean="0"/>
-              <a:t>10/27/23</a:t>
+              <a:t>11/3/23</a:t>
             </a:fld>
             <a:endParaRPr lang="en-US"/>
           </a:p>
@@ -1257,7 +1257,7 @@
           <a:p>
             <a:fld id="{8C792E63-5F21-4F54-A864-D84D9F273FCA}" type="datetimeFigureOut">
               <a:rPr lang="en-US" smtClean="0"/>
-              <a:t>10/27/23</a:t>
+              <a:t>11/3/23</a:t>
             </a:fld>
             <a:endParaRPr lang="en-US"/>
           </a:p>
@@ -1471,7 +1471,7 @@
           <a:p>
             <a:fld id="{8C792E63-5F21-4F54-A864-D84D9F273FCA}" type="datetimeFigureOut">
               <a:rPr lang="en-US" smtClean="0"/>
-              <a:t>10/27/23</a:t>
+              <a:t>11/3/23</a:t>
             </a:fld>
             <a:endParaRPr lang="en-US"/>
           </a:p>
@@ -1762,7 +1762,7 @@
           <a:p>
             <a:fld id="{8C792E63-5F21-4F54-A864-D84D9F273FCA}" type="datetimeFigureOut">
               <a:rPr lang="en-US" smtClean="0"/>
-              <a:t>10/27/23</a:t>
+              <a:t>11/3/23</a:t>
             </a:fld>
             <a:endParaRPr lang="en-US"/>
           </a:p>
@@ -2043,7 +2043,7 @@
           <a:p>
             <a:fld id="{8C792E63-5F21-4F54-A864-D84D9F273FCA}" type="datetimeFigureOut">
               <a:rPr lang="en-US" smtClean="0"/>
-              <a:t>10/27/23</a:t>
+              <a:t>11/3/23</a:t>
             </a:fld>
             <a:endParaRPr lang="en-US"/>
           </a:p>
@@ -2471,7 +2471,7 @@
           <a:p>
             <a:fld id="{8C792E63-5F21-4F54-A864-D84D9F273FCA}" type="datetimeFigureOut">
               <a:rPr lang="en-US" smtClean="0"/>
-              <a:t>10/27/23</a:t>
+              <a:t>11/3/23</a:t>
             </a:fld>
             <a:endParaRPr lang="en-US"/>
           </a:p>
@@ -2628,7 +2628,7 @@
           <a:p>
             <a:fld id="{8C792E63-5F21-4F54-A864-D84D9F273FCA}" type="datetimeFigureOut">
               <a:rPr lang="en-US" smtClean="0"/>
-              <a:t>10/27/23</a:t>
+              <a:t>11/3/23</a:t>
             </a:fld>
             <a:endParaRPr lang="en-US"/>
           </a:p>
@@ -2757,7 +2757,7 @@
           <a:p>
             <a:fld id="{8C792E63-5F21-4F54-A864-D84D9F273FCA}" type="datetimeFigureOut">
               <a:rPr lang="en-US" smtClean="0"/>
-              <a:t>10/27/23</a:t>
+              <a:t>11/3/23</a:t>
             </a:fld>
             <a:endParaRPr lang="en-US"/>
           </a:p>
@@ -3084,7 +3084,7 @@
           <a:p>
             <a:fld id="{8C792E63-5F21-4F54-A864-D84D9F273FCA}" type="datetimeFigureOut">
               <a:rPr lang="en-US" smtClean="0"/>
-              <a:t>10/27/23</a:t>
+              <a:t>11/3/23</a:t>
             </a:fld>
             <a:endParaRPr lang="en-US"/>
           </a:p>
@@ -3388,7 +3388,7 @@
           <a:p>
             <a:fld id="{8C792E63-5F21-4F54-A864-D84D9F273FCA}" type="datetimeFigureOut">
               <a:rPr lang="en-US" smtClean="0"/>
-              <a:t>10/27/23</a:t>
+              <a:t>11/3/23</a:t>
             </a:fld>
             <a:endParaRPr lang="en-US"/>
           </a:p>
@@ -3680,7 +3680,7 @@
           <a:p>
             <a:fld id="{8C792E63-5F21-4F54-A864-D84D9F273FCA}" type="datetimeFigureOut">
               <a:rPr lang="en-US" smtClean="0"/>
-              <a:t>10/27/23</a:t>
+              <a:t>11/3/23</a:t>
             </a:fld>
             <a:endParaRPr lang="en-US"/>
           </a:p>
@@ -4166,13 +4166,8 @@
           <a:p>
             <a:r>
               <a:rPr lang="en-US" sz="1900" dirty="0"/>
-              <a:t>Shepherd: Matthias </a:t>
-            </a:r>
-            <a:r>
-              <a:rPr lang="en-US" sz="1900" dirty="0" err="1"/>
-              <a:t>Kovatsch</a:t>
-            </a:r>
-            <a:endParaRPr lang="en-US" sz="1900" dirty="0"/>
+              <a:t>Shepherd: Matthias Kovatsch</a:t>
+            </a:r>
           </a:p>
           <a:p>
             <a:endParaRPr lang="en-US" sz="1900" dirty="0"/>
@@ -4561,7 +4556,7 @@
             <a:fld id="{8C792E63-5F21-4F54-A864-D84D9F273FCA}" type="datetimeFigureOut">
               <a:rPr lang="en-US" smtClean="0"/>
               <a:pPr/>
-              <a:t>10/27/23</a:t>
+              <a:t>11/3/23</a:t>
             </a:fld>
             <a:endParaRPr lang="en-US"/>
           </a:p>
@@ -4847,7 +4842,7 @@
             </a:pPr>
             <a:r>
               <a:rPr lang="en-US" dirty="0"/>
-              <a:t>WG Last Call (WGLC):	DONE</a:t>
+              <a:t>WG Last Call (WGLC):	DONE, before 116</a:t>
             </a:r>
           </a:p>
           <a:p>
@@ -4858,7 +4853,7 @@
             </a:pPr>
             <a:r>
               <a:rPr lang="en-US" dirty="0"/>
-              <a:t>Shepherd writeup:	DONE</a:t>
+              <a:t>Shepherd writeup:	DONE, July 2023</a:t>
             </a:r>
           </a:p>
           <a:p>
@@ -4867,6 +4862,14 @@
                 <a:spcPct val="100000"/>
               </a:lnSpc>
             </a:pPr>
+            <a:endParaRPr lang="en-US" dirty="0"/>
+          </a:p>
+          <a:p>
+            <a:pPr>
+              <a:lnSpc>
+                <a:spcPct val="100000"/>
+              </a:lnSpc>
+            </a:pPr>
             <a:r>
               <a:rPr lang="en-US" dirty="0"/>
               <a:t>IANA registration for </a:t>
@@ -4902,15 +4905,6 @@
               <a:rPr lang="en-US" dirty="0"/>
               <a:t>”:	TODO </a:t>
             </a:r>
-          </a:p>
-          <a:p>
-            <a:pPr marL="0" indent="0">
-              <a:lnSpc>
-                <a:spcPct val="100000"/>
-              </a:lnSpc>
-              <a:buNone/>
-            </a:pPr>
-            <a:endParaRPr lang="en-US" dirty="0"/>
           </a:p>
           <a:p>
             <a:pPr>
@@ -5122,7 +5116,7 @@
             <a:fld id="{8C792E63-5F21-4F54-A864-D84D9F273FCA}" type="datetimeFigureOut">
               <a:rPr lang="en-US" smtClean="0"/>
               <a:pPr/>
-              <a:t>10/27/23</a:t>
+              <a:t>11/3/23</a:t>
             </a:fld>
             <a:endParaRPr lang="en-US"/>
           </a:p>

</xml_diff>